<commit_message>
update image and text
</commit_message>
<xml_diff>
--- a/media/AI.pptx
+++ b/media/AI.pptx
@@ -105,6 +105,11 @@
       </a:defRPr>
     </a:lvl9pPr>
   </p:defaultTextStyle>
+  <p:extLst>
+    <p:ext uri="{EFAFB233-063F-42B5-8137-9DF3F51BA10A}">
+      <p15:sldGuideLst xmlns:p15="http://schemas.microsoft.com/office/powerpoint/2012/main"/>
+    </p:ext>
+  </p:extLst>
 </p:presentation>
 </file>
 
@@ -3408,12 +3413,112 @@
           <a:chExt cx="0" cy="0"/>
         </a:xfrm>
       </p:grpSpPr>
+      <p:grpSp>
+        <p:nvGrpSpPr>
+          <p:cNvPr id="6" name="Group 5">
+            <a:extLst>
+              <a:ext uri="{FF2B5EF4-FFF2-40B4-BE49-F238E27FC236}">
+                <a16:creationId xmlns:a16="http://schemas.microsoft.com/office/drawing/2014/main" id="{FEE11A18-6071-D96B-3B43-9093241A579C}"/>
+              </a:ext>
+            </a:extLst>
+          </p:cNvPr>
+          <p:cNvGrpSpPr/>
+          <p:nvPr/>
+        </p:nvGrpSpPr>
+        <p:grpSpPr>
+          <a:xfrm>
+            <a:off x="327666" y="335559"/>
+            <a:ext cx="3644555" cy="1918013"/>
+            <a:chOff x="327666" y="335559"/>
+            <a:chExt cx="3644555" cy="1918013"/>
+          </a:xfrm>
+        </p:grpSpPr>
+        <p:pic>
+          <p:nvPicPr>
+            <p:cNvPr id="3" name="Picture 2">
+              <a:extLst>
+                <a:ext uri="{FF2B5EF4-FFF2-40B4-BE49-F238E27FC236}">
+                  <a16:creationId xmlns:a16="http://schemas.microsoft.com/office/drawing/2014/main" id="{5A83EED4-4DE4-B799-BFF2-7CF4FC93396C}"/>
+                </a:ext>
+              </a:extLst>
+            </p:cNvPr>
+            <p:cNvPicPr>
+              <a:picLocks noChangeAspect="1"/>
+            </p:cNvPicPr>
+            <p:nvPr/>
+          </p:nvPicPr>
+          <p:blipFill>
+            <a:blip r:embed="rId2"/>
+            <a:stretch>
+              <a:fillRect/>
+            </a:stretch>
+          </p:blipFill>
+          <p:spPr>
+            <a:xfrm>
+              <a:off x="327666" y="335559"/>
+              <a:ext cx="3644555" cy="1918013"/>
+            </a:xfrm>
+            <a:prstGeom prst="rect">
+              <a:avLst/>
+            </a:prstGeom>
+          </p:spPr>
+        </p:pic>
+        <p:sp>
+          <p:nvSpPr>
+            <p:cNvPr id="4" name="TextBox 3">
+              <a:extLst>
+                <a:ext uri="{FF2B5EF4-FFF2-40B4-BE49-F238E27FC236}">
+                  <a16:creationId xmlns:a16="http://schemas.microsoft.com/office/drawing/2014/main" id="{6861CAF8-70C2-CAA4-0BC6-D17BA1C0FA36}"/>
+                </a:ext>
+              </a:extLst>
+            </p:cNvPr>
+            <p:cNvSpPr txBox="1"/>
+            <p:nvPr/>
+          </p:nvSpPr>
+          <p:spPr>
+            <a:xfrm>
+              <a:off x="327666" y="1707845"/>
+              <a:ext cx="2648823" cy="523220"/>
+            </a:xfrm>
+            <a:prstGeom prst="rect">
+              <a:avLst/>
+            </a:prstGeom>
+            <a:noFill/>
+          </p:spPr>
+          <p:txBody>
+            <a:bodyPr wrap="square">
+              <a:spAutoFit/>
+            </a:bodyPr>
+            <a:lstStyle/>
+            <a:p>
+              <a:r>
+                <a:rPr lang="en-US" sz="1400" dirty="0">
+                  <a:solidFill>
+                    <a:schemeClr val="bg1"/>
+                  </a:solidFill>
+                </a:rPr>
+                <a:t>A journey of a thousand </a:t>
+              </a:r>
+            </a:p>
+            <a:p>
+              <a:r>
+                <a:rPr lang="en-US" sz="1400" dirty="0">
+                  <a:solidFill>
+                    <a:schemeClr val="bg1"/>
+                  </a:solidFill>
+                </a:rPr>
+                <a:t>miles starts wit the first step</a:t>
+              </a:r>
+            </a:p>
+          </p:txBody>
+        </p:sp>
+      </p:grpSp>
       <p:pic>
         <p:nvPicPr>
-          <p:cNvPr id="3" name="Picture 2">
-            <a:extLst>
-              <a:ext uri="{FF2B5EF4-FFF2-40B4-BE49-F238E27FC236}">
-                <a16:creationId xmlns:a16="http://schemas.microsoft.com/office/drawing/2014/main" id="{5A83EED4-4DE4-B799-BFF2-7CF4FC93396C}"/>
+          <p:cNvPr id="5" name="Picture 4">
+            <a:extLst>
+              <a:ext uri="{FF2B5EF4-FFF2-40B4-BE49-F238E27FC236}">
+                <a16:creationId xmlns:a16="http://schemas.microsoft.com/office/drawing/2014/main" id="{9AC808F6-AFD2-54C0-3F7D-ED52E0AC84BC}"/>
               </a:ext>
             </a:extLst>
           </p:cNvPr>
@@ -3423,15 +3528,15 @@
           <p:nvPr/>
         </p:nvPicPr>
         <p:blipFill>
-          <a:blip r:embed="rId2"/>
+          <a:blip r:embed="rId3"/>
           <a:stretch>
             <a:fillRect/>
           </a:stretch>
         </p:blipFill>
         <p:spPr>
           <a:xfrm>
-            <a:off x="327666" y="335559"/>
-            <a:ext cx="3644555" cy="1918013"/>
+            <a:off x="4398973" y="335559"/>
+            <a:ext cx="3645724" cy="1920406"/>
           </a:xfrm>
           <a:prstGeom prst="rect">
             <a:avLst/>

</xml_diff>

<commit_message>
Big code and README update.
</commit_message>
<xml_diff>
--- a/media/AI.pptx
+++ b/media/AI.pptx
@@ -262,7 +262,7 @@
           <a:p>
             <a:fld id="{7C381302-393E-4B0F-A5BD-7D5F84EF0D30}" type="datetimeFigureOut">
               <a:rPr lang="en-US" smtClean="0"/>
-              <a:t>8/21/2023</a:t>
+              <a:t>9/16/2023</a:t>
             </a:fld>
             <a:endParaRPr lang="en-US"/>
           </a:p>
@@ -460,7 +460,7 @@
           <a:p>
             <a:fld id="{7C381302-393E-4B0F-A5BD-7D5F84EF0D30}" type="datetimeFigureOut">
               <a:rPr lang="en-US" smtClean="0"/>
-              <a:t>8/21/2023</a:t>
+              <a:t>9/16/2023</a:t>
             </a:fld>
             <a:endParaRPr lang="en-US"/>
           </a:p>
@@ -668,7 +668,7 @@
           <a:p>
             <a:fld id="{7C381302-393E-4B0F-A5BD-7D5F84EF0D30}" type="datetimeFigureOut">
               <a:rPr lang="en-US" smtClean="0"/>
-              <a:t>8/21/2023</a:t>
+              <a:t>9/16/2023</a:t>
             </a:fld>
             <a:endParaRPr lang="en-US"/>
           </a:p>
@@ -866,7 +866,7 @@
           <a:p>
             <a:fld id="{7C381302-393E-4B0F-A5BD-7D5F84EF0D30}" type="datetimeFigureOut">
               <a:rPr lang="en-US" smtClean="0"/>
-              <a:t>8/21/2023</a:t>
+              <a:t>9/16/2023</a:t>
             </a:fld>
             <a:endParaRPr lang="en-US"/>
           </a:p>
@@ -1141,7 +1141,7 @@
           <a:p>
             <a:fld id="{7C381302-393E-4B0F-A5BD-7D5F84EF0D30}" type="datetimeFigureOut">
               <a:rPr lang="en-US" smtClean="0"/>
-              <a:t>8/21/2023</a:t>
+              <a:t>9/16/2023</a:t>
             </a:fld>
             <a:endParaRPr lang="en-US"/>
           </a:p>
@@ -1406,7 +1406,7 @@
           <a:p>
             <a:fld id="{7C381302-393E-4B0F-A5BD-7D5F84EF0D30}" type="datetimeFigureOut">
               <a:rPr lang="en-US" smtClean="0"/>
-              <a:t>8/21/2023</a:t>
+              <a:t>9/16/2023</a:t>
             </a:fld>
             <a:endParaRPr lang="en-US"/>
           </a:p>
@@ -1818,7 +1818,7 @@
           <a:p>
             <a:fld id="{7C381302-393E-4B0F-A5BD-7D5F84EF0D30}" type="datetimeFigureOut">
               <a:rPr lang="en-US" smtClean="0"/>
-              <a:t>8/21/2023</a:t>
+              <a:t>9/16/2023</a:t>
             </a:fld>
             <a:endParaRPr lang="en-US"/>
           </a:p>
@@ -1959,7 +1959,7 @@
           <a:p>
             <a:fld id="{7C381302-393E-4B0F-A5BD-7D5F84EF0D30}" type="datetimeFigureOut">
               <a:rPr lang="en-US" smtClean="0"/>
-              <a:t>8/21/2023</a:t>
+              <a:t>9/16/2023</a:t>
             </a:fld>
             <a:endParaRPr lang="en-US"/>
           </a:p>
@@ -2072,7 +2072,7 @@
           <a:p>
             <a:fld id="{7C381302-393E-4B0F-A5BD-7D5F84EF0D30}" type="datetimeFigureOut">
               <a:rPr lang="en-US" smtClean="0"/>
-              <a:t>8/21/2023</a:t>
+              <a:t>9/16/2023</a:t>
             </a:fld>
             <a:endParaRPr lang="en-US"/>
           </a:p>
@@ -2383,7 +2383,7 @@
           <a:p>
             <a:fld id="{7C381302-393E-4B0F-A5BD-7D5F84EF0D30}" type="datetimeFigureOut">
               <a:rPr lang="en-US" smtClean="0"/>
-              <a:t>8/21/2023</a:t>
+              <a:t>9/16/2023</a:t>
             </a:fld>
             <a:endParaRPr lang="en-US"/>
           </a:p>
@@ -2671,7 +2671,7 @@
           <a:p>
             <a:fld id="{7C381302-393E-4B0F-A5BD-7D5F84EF0D30}" type="datetimeFigureOut">
               <a:rPr lang="en-US" smtClean="0"/>
-              <a:t>8/21/2023</a:t>
+              <a:t>9/16/2023</a:t>
             </a:fld>
             <a:endParaRPr lang="en-US"/>
           </a:p>
@@ -2912,7 +2912,7 @@
           <a:p>
             <a:fld id="{7C381302-393E-4B0F-A5BD-7D5F84EF0D30}" type="datetimeFigureOut">
               <a:rPr lang="en-US" smtClean="0"/>
-              <a:t>8/21/2023</a:t>
+              <a:t>9/16/2023</a:t>
             </a:fld>
             <a:endParaRPr lang="en-US"/>
           </a:p>
@@ -4953,6 +4953,36 @@
           </p:txBody>
         </p:sp>
       </p:grpSp>
+      <p:pic>
+        <p:nvPicPr>
+          <p:cNvPr id="4" name="Picture 3">
+            <a:extLst>
+              <a:ext uri="{FF2B5EF4-FFF2-40B4-BE49-F238E27FC236}">
+                <a16:creationId xmlns:a16="http://schemas.microsoft.com/office/drawing/2014/main" id="{2F552C93-0A12-A5DE-3F96-F87C5F804936}"/>
+              </a:ext>
+            </a:extLst>
+          </p:cNvPr>
+          <p:cNvPicPr>
+            <a:picLocks noChangeAspect="1"/>
+          </p:cNvPicPr>
+          <p:nvPr/>
+        </p:nvPicPr>
+        <p:blipFill>
+          <a:blip r:embed="rId3"/>
+          <a:stretch>
+            <a:fillRect/>
+          </a:stretch>
+        </p:blipFill>
+        <p:spPr>
+          <a:xfrm>
+            <a:off x="6444659" y="851438"/>
+            <a:ext cx="359695" cy="390178"/>
+          </a:xfrm>
+          <a:prstGeom prst="rect">
+            <a:avLst/>
+          </a:prstGeom>
+        </p:spPr>
+      </p:pic>
     </p:spTree>
     <p:extLst>
       <p:ext uri="{BB962C8B-B14F-4D97-AF65-F5344CB8AC3E}">

</xml_diff>

<commit_message>
Added picture by AI
</commit_message>
<xml_diff>
--- a/media/AI.pptx
+++ b/media/AI.pptx
@@ -4953,12 +4953,125 @@
           </p:txBody>
         </p:sp>
       </p:grpSp>
+      <p:sp>
+        <p:nvSpPr>
+          <p:cNvPr id="8" name="TextBox 7">
+            <a:extLst>
+              <a:ext uri="{FF2B5EF4-FFF2-40B4-BE49-F238E27FC236}">
+                <a16:creationId xmlns:a16="http://schemas.microsoft.com/office/drawing/2014/main" id="{7C3CB38B-37E6-941C-26D5-C842E66D7473}"/>
+              </a:ext>
+            </a:extLst>
+          </p:cNvPr>
+          <p:cNvSpPr txBox="1"/>
+          <p:nvPr/>
+        </p:nvSpPr>
+        <p:spPr>
+          <a:xfrm>
+            <a:off x="3047301" y="3246431"/>
+            <a:ext cx="6094602" cy="369332"/>
+          </a:xfrm>
+          <a:prstGeom prst="rect">
+            <a:avLst/>
+          </a:prstGeom>
+          <a:noFill/>
+        </p:spPr>
+        <p:txBody>
+          <a:bodyPr wrap="square">
+            <a:spAutoFit/>
+          </a:bodyPr>
+          <a:lstStyle/>
+          <a:p>
+            <a:endParaRPr lang="en-US" dirty="0"/>
+          </a:p>
+        </p:txBody>
+      </p:sp>
+      <p:grpSp>
+        <p:nvGrpSpPr>
+          <p:cNvPr id="12" name="Group 11">
+            <a:extLst>
+              <a:ext uri="{FF2B5EF4-FFF2-40B4-BE49-F238E27FC236}">
+                <a16:creationId xmlns:a16="http://schemas.microsoft.com/office/drawing/2014/main" id="{BF7547FF-45EE-A329-F885-031809BCAF91}"/>
+              </a:ext>
+            </a:extLst>
+          </p:cNvPr>
+          <p:cNvGrpSpPr/>
+          <p:nvPr/>
+        </p:nvGrpSpPr>
+        <p:grpSpPr>
+          <a:xfrm>
+            <a:off x="5755139" y="513607"/>
+            <a:ext cx="3254272" cy="3183697"/>
+            <a:chOff x="5755139" y="513607"/>
+            <a:chExt cx="3254272" cy="3183697"/>
+          </a:xfrm>
+        </p:grpSpPr>
+        <p:pic>
+          <p:nvPicPr>
+            <p:cNvPr id="10" name="Picture 9">
+              <a:extLst>
+                <a:ext uri="{FF2B5EF4-FFF2-40B4-BE49-F238E27FC236}">
+                  <a16:creationId xmlns:a16="http://schemas.microsoft.com/office/drawing/2014/main" id="{17FA39EA-E1B0-4F0A-E6E4-C75F38FAC04B}"/>
+                </a:ext>
+              </a:extLst>
+            </p:cNvPr>
+            <p:cNvPicPr>
+              <a:picLocks noChangeAspect="1"/>
+            </p:cNvPicPr>
+            <p:nvPr/>
+          </p:nvPicPr>
+          <p:blipFill>
+            <a:blip r:embed="rId3"/>
+            <a:stretch>
+              <a:fillRect/>
+            </a:stretch>
+          </p:blipFill>
+          <p:spPr>
+            <a:xfrm>
+              <a:off x="5755139" y="513607"/>
+              <a:ext cx="3254272" cy="3183697"/>
+            </a:xfrm>
+            <a:prstGeom prst="rect">
+              <a:avLst/>
+            </a:prstGeom>
+          </p:spPr>
+        </p:pic>
+        <p:pic>
+          <p:nvPicPr>
+            <p:cNvPr id="4" name="Picture 3">
+              <a:extLst>
+                <a:ext uri="{FF2B5EF4-FFF2-40B4-BE49-F238E27FC236}">
+                  <a16:creationId xmlns:a16="http://schemas.microsoft.com/office/drawing/2014/main" id="{2F552C93-0A12-A5DE-3F96-F87C5F804936}"/>
+                </a:ext>
+              </a:extLst>
+            </p:cNvPr>
+            <p:cNvPicPr>
+              <a:picLocks noChangeAspect="1"/>
+            </p:cNvPicPr>
+            <p:nvPr/>
+          </p:nvPicPr>
+          <p:blipFill>
+            <a:blip r:embed="rId4"/>
+            <a:stretch>
+              <a:fillRect/>
+            </a:stretch>
+          </p:blipFill>
+          <p:spPr>
+            <a:xfrm>
+              <a:off x="8649716" y="614275"/>
+              <a:ext cx="359695" cy="390178"/>
+            </a:xfrm>
+            <a:prstGeom prst="rect">
+              <a:avLst/>
+            </a:prstGeom>
+          </p:spPr>
+        </p:pic>
+      </p:grpSp>
       <p:pic>
         <p:nvPicPr>
-          <p:cNvPr id="4" name="Picture 3">
-            <a:extLst>
-              <a:ext uri="{FF2B5EF4-FFF2-40B4-BE49-F238E27FC236}">
-                <a16:creationId xmlns:a16="http://schemas.microsoft.com/office/drawing/2014/main" id="{2F552C93-0A12-A5DE-3F96-F87C5F804936}"/>
+          <p:cNvPr id="11" name="Picture 10">
+            <a:extLst>
+              <a:ext uri="{FF2B5EF4-FFF2-40B4-BE49-F238E27FC236}">
+                <a16:creationId xmlns:a16="http://schemas.microsoft.com/office/drawing/2014/main" id="{616BA7E3-CB5B-3784-1E58-329FA6D95C1F}"/>
               </a:ext>
             </a:extLst>
           </p:cNvPr>
@@ -4968,14 +5081,14 @@
           <p:nvPr/>
         </p:nvPicPr>
         <p:blipFill>
-          <a:blip r:embed="rId3"/>
+          <a:blip r:embed="rId4"/>
           <a:stretch>
             <a:fillRect/>
           </a:stretch>
         </p:blipFill>
         <p:spPr>
           <a:xfrm>
-            <a:off x="6444659" y="851438"/>
+            <a:off x="10379095" y="1558210"/>
             <a:ext cx="359695" cy="390178"/>
           </a:xfrm>
           <a:prstGeom prst="rect">

</xml_diff>